<commit_message>
URL added to the presentation
</commit_message>
<xml_diff>
--- a/Loan_approval_Prezi.pptx
+++ b/Loan_approval_Prezi.pptx
@@ -211,7 +211,7 @@
           <a:p>
             <a:fld id="{E286FD15-60BD-448E-93F3-E9C0354025CB}" type="datetimeFigureOut">
               <a:rPr lang="hu-HU" smtClean="0"/>
-              <a:t>2024. 12. 11.</a:t>
+              <a:t>2025. 03. 11.</a:t>
             </a:fld>
             <a:endParaRPr lang="hu-HU"/>
           </a:p>
@@ -377,7 +377,7 @@
           <a:p>
             <a:fld id="{945779A9-2F62-41F1-8D39-20DA253901A2}" type="datetimeFigureOut">
               <a:rPr lang="hu-HU" smtClean="0"/>
-              <a:t>2024. 12. 11.</a:t>
+              <a:t>2025. 03. 11.</a:t>
             </a:fld>
             <a:endParaRPr lang="hu-HU"/>
           </a:p>
@@ -1159,7 +1159,7 @@
             <a:pPr algn="l"/>
             <a:fld id="{2508C36B-3B60-4C26-ADB5-50C5F67D672E}" type="datetime4">
               <a:rPr lang="hu-HU" smtClean="0"/>
-              <a:t>2024. december 11.</a:t>
+              <a:t>2025. március 11.</a:t>
             </a:fld>
             <a:endParaRPr lang="hu-HU">
               <a:solidFill>
@@ -1602,7 +1602,7 @@
             <a:pPr algn="l"/>
             <a:fld id="{2508C36B-3B60-4C26-ADB5-50C5F67D672E}" type="datetime4">
               <a:rPr lang="hu-HU" smtClean="0"/>
-              <a:t>2024. december 11.</a:t>
+              <a:t>2025. március 11.</a:t>
             </a:fld>
             <a:endParaRPr lang="hu-HU">
               <a:solidFill>
@@ -2048,7 +2048,7 @@
             <a:pPr algn="l"/>
             <a:fld id="{2508C36B-3B60-4C26-ADB5-50C5F67D672E}" type="datetime4">
               <a:rPr lang="hu-HU" smtClean="0"/>
-              <a:t>2024. december 11.</a:t>
+              <a:t>2025. március 11.</a:t>
             </a:fld>
             <a:endParaRPr lang="hu-HU">
               <a:solidFill>
@@ -2494,7 +2494,7 @@
             <a:pPr algn="l"/>
             <a:fld id="{2508C36B-3B60-4C26-ADB5-50C5F67D672E}" type="datetime4">
               <a:rPr lang="hu-HU" smtClean="0"/>
-              <a:t>2024. december 11.</a:t>
+              <a:t>2025. március 11.</a:t>
             </a:fld>
             <a:endParaRPr lang="hu-HU">
               <a:solidFill>
@@ -2927,7 +2927,7 @@
             <a:pPr algn="l"/>
             <a:fld id="{2508C36B-3B60-4C26-ADB5-50C5F67D672E}" type="datetime4">
               <a:rPr lang="hu-HU" smtClean="0"/>
-              <a:t>2024. december 11.</a:t>
+              <a:t>2025. március 11.</a:t>
             </a:fld>
             <a:endParaRPr lang="hu-HU">
               <a:solidFill>
@@ -3360,7 +3360,7 @@
             <a:pPr algn="l"/>
             <a:fld id="{2508C36B-3B60-4C26-ADB5-50C5F67D672E}" type="datetime4">
               <a:rPr lang="hu-HU" smtClean="0"/>
-              <a:t>2024. december 11.</a:t>
+              <a:t>2025. március 11.</a:t>
             </a:fld>
             <a:endParaRPr lang="hu-HU">
               <a:solidFill>
@@ -3785,7 +3785,7 @@
             <a:pPr algn="l"/>
             <a:fld id="{2508C36B-3B60-4C26-ADB5-50C5F67D672E}" type="datetime4">
               <a:rPr lang="hu-HU" smtClean="0"/>
-              <a:t>2024. december 11.</a:t>
+              <a:t>2025. március 11.</a:t>
             </a:fld>
             <a:endParaRPr lang="hu-HU">
               <a:solidFill>
@@ -4372,7 +4372,7 @@
             <a:pPr algn="l"/>
             <a:fld id="{2508C36B-3B60-4C26-ADB5-50C5F67D672E}" type="datetime4">
               <a:rPr lang="hu-HU" smtClean="0"/>
-              <a:t>2024. december 11.</a:t>
+              <a:t>2025. március 11.</a:t>
             </a:fld>
             <a:endParaRPr lang="hu-HU">
               <a:solidFill>
@@ -4965,7 +4965,7 @@
             <a:pPr algn="l"/>
             <a:fld id="{2508C36B-3B60-4C26-ADB5-50C5F67D672E}" type="datetime4">
               <a:rPr lang="hu-HU" smtClean="0"/>
-              <a:t>2024. december 11.</a:t>
+              <a:t>2025. március 11.</a:t>
             </a:fld>
             <a:endParaRPr lang="hu-HU">
               <a:solidFill>
@@ -5566,7 +5566,7 @@
             <a:pPr algn="l"/>
             <a:fld id="{2508C36B-3B60-4C26-ADB5-50C5F67D672E}" type="datetime4">
               <a:rPr lang="hu-HU" smtClean="0"/>
-              <a:t>2024. december 11.</a:t>
+              <a:t>2025. március 11.</a:t>
             </a:fld>
             <a:endParaRPr lang="hu-HU">
               <a:solidFill>
@@ -6023,7 +6023,7 @@
             <a:pPr algn="l"/>
             <a:fld id="{2508C36B-3B60-4C26-ADB5-50C5F67D672E}" type="datetime4">
               <a:rPr lang="hu-HU" smtClean="0"/>
-              <a:t>2024. december 11.</a:t>
+              <a:t>2025. március 11.</a:t>
             </a:fld>
             <a:endParaRPr lang="hu-HU">
               <a:solidFill>
@@ -6449,7 +6449,7 @@
             <a:pPr algn="l"/>
             <a:fld id="{2508C36B-3B60-4C26-ADB5-50C5F67D672E}" type="datetime4">
               <a:rPr lang="hu-HU" smtClean="0"/>
-              <a:t>2024. december 11.</a:t>
+              <a:t>2025. március 11.</a:t>
             </a:fld>
             <a:endParaRPr lang="hu-HU">
               <a:solidFill>
@@ -6878,7 +6878,7 @@
             <a:pPr algn="l"/>
             <a:fld id="{2508C36B-3B60-4C26-ADB5-50C5F67D672E}" type="datetime4">
               <a:rPr lang="hu-HU" smtClean="0"/>
-              <a:t>2024. december 11.</a:t>
+              <a:t>2025. március 11.</a:t>
             </a:fld>
             <a:endParaRPr lang="hu-HU">
               <a:solidFill>
@@ -7307,7 +7307,7 @@
             <a:pPr algn="l"/>
             <a:fld id="{2508C36B-3B60-4C26-ADB5-50C5F67D672E}" type="datetime4">
               <a:rPr lang="hu-HU" smtClean="0"/>
-              <a:t>2024. december 11.</a:t>
+              <a:t>2025. március 11.</a:t>
             </a:fld>
             <a:endParaRPr lang="hu-HU">
               <a:solidFill>
@@ -7625,7 +7625,7 @@
             <a:pPr algn="l"/>
             <a:fld id="{2508C36B-3B60-4C26-ADB5-50C5F67D672E}" type="datetime4">
               <a:rPr lang="hu-HU" smtClean="0"/>
-              <a:t>2024. december 11.</a:t>
+              <a:t>2025. március 11.</a:t>
             </a:fld>
             <a:endParaRPr lang="hu-HU">
               <a:solidFill>
@@ -7901,7 +7901,7 @@
             <a:pPr algn="l"/>
             <a:fld id="{2508C36B-3B60-4C26-ADB5-50C5F67D672E}" type="datetime4">
               <a:rPr lang="hu-HU" smtClean="0"/>
-              <a:t>2024. december 11.</a:t>
+              <a:t>2025. március 11.</a:t>
             </a:fld>
             <a:endParaRPr lang="hu-HU">
               <a:solidFill>
@@ -8312,7 +8312,7 @@
             <a:pPr algn="l"/>
             <a:fld id="{2508C36B-3B60-4C26-ADB5-50C5F67D672E}" type="datetime4">
               <a:rPr lang="hu-HU" smtClean="0"/>
-              <a:t>2024. december 11.</a:t>
+              <a:t>2025. március 11.</a:t>
             </a:fld>
             <a:endParaRPr lang="hu-HU">
               <a:solidFill>
@@ -8663,7 +8663,7 @@
             <a:pPr algn="l"/>
             <a:fld id="{2508C36B-3B60-4C26-ADB5-50C5F67D672E}" type="datetime4">
               <a:rPr lang="hu-HU" smtClean="0"/>
-              <a:t>2024. december 11.</a:t>
+              <a:t>2025. március 11.</a:t>
             </a:fld>
             <a:endParaRPr lang="hu-HU">
               <a:solidFill>
@@ -9137,7 +9137,7 @@
             <a:pPr algn="l"/>
             <a:fld id="{2508C36B-3B60-4C26-ADB5-50C5F67D672E}" type="datetime4">
               <a:rPr lang="hu-HU" smtClean="0"/>
-              <a:t>2024. december 11.</a:t>
+              <a:t>2025. március 11.</a:t>
             </a:fld>
             <a:endParaRPr lang="hu-HU">
               <a:solidFill>
@@ -9530,7 +9530,7 @@
             <a:pPr algn="l"/>
             <a:fld id="{2508C36B-3B60-4C26-ADB5-50C5F67D672E}" type="datetime4">
               <a:rPr lang="hu-HU" smtClean="0"/>
-              <a:t>2024. december 11.</a:t>
+              <a:t>2025. március 11.</a:t>
             </a:fld>
             <a:endParaRPr lang="hu-HU">
               <a:solidFill>
@@ -9936,7 +9936,7 @@
             <a:pPr algn="l"/>
             <a:fld id="{2508C36B-3B60-4C26-ADB5-50C5F67D672E}" type="datetime4">
               <a:rPr lang="hu-HU" smtClean="0"/>
-              <a:t>2024. december 11.</a:t>
+              <a:t>2025. március 11.</a:t>
             </a:fld>
             <a:endParaRPr lang="hu-HU">
               <a:solidFill>
@@ -10393,7 +10393,7 @@
             <a:pPr algn="l"/>
             <a:fld id="{2508C36B-3B60-4C26-ADB5-50C5F67D672E}" type="datetime4">
               <a:rPr lang="hu-HU" smtClean="0"/>
-              <a:t>2024. december 11.</a:t>
+              <a:t>2025. március 11.</a:t>
             </a:fld>
             <a:endParaRPr lang="hu-HU">
               <a:solidFill>
@@ -10894,7 +10894,7 @@
             <a:pPr algn="l"/>
             <a:fld id="{2508C36B-3B60-4C26-ADB5-50C5F67D672E}" type="datetime4">
               <a:rPr lang="hu-HU" smtClean="0"/>
-              <a:t>2024. december 11.</a:t>
+              <a:t>2025. március 11.</a:t>
             </a:fld>
             <a:endParaRPr lang="hu-HU">
               <a:solidFill>
@@ -11443,7 +11443,7 @@
             <a:pPr algn="l"/>
             <a:fld id="{2508C36B-3B60-4C26-ADB5-50C5F67D672E}" type="datetime4">
               <a:rPr lang="hu-HU" smtClean="0"/>
-              <a:t>2024. december 11.</a:t>
+              <a:t>2025. március 11.</a:t>
             </a:fld>
             <a:endParaRPr lang="hu-HU">
               <a:solidFill>
@@ -11991,7 +11991,7 @@
             <a:pPr algn="l"/>
             <a:fld id="{2508C36B-3B60-4C26-ADB5-50C5F67D672E}" type="datetime4">
               <a:rPr lang="hu-HU" smtClean="0"/>
-              <a:t>2024. december 11.</a:t>
+              <a:t>2025. március 11.</a:t>
             </a:fld>
             <a:endParaRPr lang="hu-HU">
               <a:solidFill>
@@ -12539,7 +12539,7 @@
             <a:pPr algn="l"/>
             <a:fld id="{2508C36B-3B60-4C26-ADB5-50C5F67D672E}" type="datetime4">
               <a:rPr lang="hu-HU" smtClean="0"/>
-              <a:t>2024. december 11.</a:t>
+              <a:t>2025. március 11.</a:t>
             </a:fld>
             <a:endParaRPr lang="hu-HU">
               <a:solidFill>
@@ -13060,7 +13060,7 @@
             <a:pPr algn="l"/>
             <a:fld id="{2508C36B-3B60-4C26-ADB5-50C5F67D672E}" type="datetime4">
               <a:rPr lang="hu-HU" smtClean="0"/>
-              <a:t>2024. december 11.</a:t>
+              <a:t>2025. március 11.</a:t>
             </a:fld>
             <a:endParaRPr lang="hu-HU">
               <a:solidFill>
@@ -13614,7 +13614,7 @@
             <a:pPr algn="l"/>
             <a:fld id="{2508C36B-3B60-4C26-ADB5-50C5F67D672E}" type="datetime4">
               <a:rPr lang="hu-HU" smtClean="0"/>
-              <a:t>2024. december 11.</a:t>
+              <a:t>2025. március 11.</a:t>
             </a:fld>
             <a:endParaRPr lang="hu-HU">
               <a:solidFill>
@@ -14076,7 +14076,7 @@
             <a:pPr algn="l"/>
             <a:fld id="{2508C36B-3B60-4C26-ADB5-50C5F67D672E}" type="datetime4">
               <a:rPr lang="hu-HU" smtClean="0"/>
-              <a:t>2024. december 11.</a:t>
+              <a:t>2025. március 11.</a:t>
             </a:fld>
             <a:endParaRPr lang="hu-HU">
               <a:solidFill>
@@ -14525,7 +14525,7 @@
             <a:pPr algn="l"/>
             <a:fld id="{2508C36B-3B60-4C26-ADB5-50C5F67D672E}" type="datetime4">
               <a:rPr lang="hu-HU" smtClean="0"/>
-              <a:t>2024. december 11.</a:t>
+              <a:t>2025. március 11.</a:t>
             </a:fld>
             <a:endParaRPr lang="hu-HU">
               <a:solidFill>
@@ -14935,7 +14935,7 @@
             <a:pPr algn="l"/>
             <a:fld id="{2508C36B-3B60-4C26-ADB5-50C5F67D672E}" type="datetime4">
               <a:rPr lang="hu-HU" smtClean="0"/>
-              <a:t>2024. december 11.</a:t>
+              <a:t>2025. március 11.</a:t>
             </a:fld>
             <a:endParaRPr lang="hu-HU">
               <a:solidFill>
@@ -15269,7 +15269,7 @@
             <a:pPr algn="l"/>
             <a:fld id="{2508C36B-3B60-4C26-ADB5-50C5F67D672E}" type="datetime4">
               <a:rPr lang="hu-HU" smtClean="0"/>
-              <a:t>2024. december 11.</a:t>
+              <a:t>2025. március 11.</a:t>
             </a:fld>
             <a:endParaRPr lang="hu-HU">
               <a:solidFill>
@@ -16131,6 +16131,10 @@
               <a:buFont typeface="Arial" panose="020B0604020202020204" pitchFamily="34" charset="0"/>
               <a:buChar char="•"/>
             </a:pPr>
+            <a:r>
+              <a:rPr lang="hu-HU" sz="1600"/>
+              <a:t>https://ml-loan-approval-prediction.streamlit.app/</a:t>
+            </a:r>
             <a:endParaRPr lang="hu-HU" sz="1600" dirty="0"/>
           </a:p>
         </p:txBody>
@@ -21251,18 +21255,18 @@
 </file>
 
 <file path=customXml/item1.xml><?xml version="1.0" encoding="utf-8"?>
-<p:properties xmlns:p="http://schemas.microsoft.com/office/2006/metadata/properties" xmlns:xsi="http://www.w3.org/2001/XMLSchema-instance" xmlns:pc="http://schemas.microsoft.com/office/infopath/2007/PartnerControls">
-  <documentManagement/>
-</p:properties>
-</file>
-
-<file path=customXml/item2.xml><?xml version="1.0" encoding="utf-8"?>
 <?mso-contentType ?>
 <FormTemplates xmlns="http://schemas.microsoft.com/sharepoint/v3/contenttype/forms">
   <Display>DocumentLibraryForm</Display>
   <Edit>DocumentLibraryForm</Edit>
   <New>DocumentLibraryForm</New>
 </FormTemplates>
+</file>
+
+<file path=customXml/item2.xml><?xml version="1.0" encoding="utf-8"?>
+<p:properties xmlns:p="http://schemas.microsoft.com/office/2006/metadata/properties" xmlns:xsi="http://www.w3.org/2001/XMLSchema-instance" xmlns:pc="http://schemas.microsoft.com/office/infopath/2007/PartnerControls">
+  <documentManagement/>
+</p:properties>
 </file>
 
 <file path=customXml/item3.xml><?xml version="1.0" encoding="utf-8"?>
@@ -21410,6 +21414,14 @@
 </file>
 
 <file path=customXml/itemProps1.xml><?xml version="1.0" encoding="utf-8"?>
+<ds:datastoreItem xmlns:ds="http://schemas.openxmlformats.org/officeDocument/2006/customXml" ds:itemID="{1BBA3A4B-F75D-46B7-A527-11F0509996D9}">
+  <ds:schemaRefs>
+    <ds:schemaRef ds:uri="http://schemas.microsoft.com/sharepoint/v3/contenttype/forms"/>
+  </ds:schemaRefs>
+</ds:datastoreItem>
+</file>
+
+<file path=customXml/itemProps2.xml><?xml version="1.0" encoding="utf-8"?>
 <ds:datastoreItem xmlns:ds="http://schemas.openxmlformats.org/officeDocument/2006/customXml" ds:itemID="{9B92DE76-62B5-49FE-880F-0A3FBC60AB87}">
   <ds:schemaRefs>
     <ds:schemaRef ds:uri="http://schemas.microsoft.com/office/2006/documentManagement/types"/>
@@ -21421,14 +21433,6 @@
     <ds:schemaRef ds:uri="http://schemas.microsoft.com/office/infopath/2007/PartnerControls"/>
     <ds:schemaRef ds:uri="e16a8d59-5ec1-4305-a348-1ba75ecba124"/>
     <ds:schemaRef ds:uri="http://purl.org/dc/terms/"/>
-  </ds:schemaRefs>
-</ds:datastoreItem>
-</file>
-
-<file path=customXml/itemProps2.xml><?xml version="1.0" encoding="utf-8"?>
-<ds:datastoreItem xmlns:ds="http://schemas.openxmlformats.org/officeDocument/2006/customXml" ds:itemID="{1BBA3A4B-F75D-46B7-A527-11F0509996D9}">
-  <ds:schemaRefs>
-    <ds:schemaRef ds:uri="http://schemas.microsoft.com/sharepoint/v3/contenttype/forms"/>
   </ds:schemaRefs>
 </ds:datastoreItem>
 </file>

</xml_diff>